<commit_message>
grasp_mcmc with new hand
</commit_message>
<xml_diff>
--- a/ForceClosure/aaai/figs/overview.pptx
+++ b/ForceClosure/aaai/figs/overview.pptx
@@ -6,6 +6,9 @@
   </p:sldMasterIdLst>
   <p:sldIdLst>
     <p:sldId id="256" r:id="rId2"/>
+    <p:sldId id="257" r:id="rId3"/>
+    <p:sldId id="258" r:id="rId4"/>
+    <p:sldId id="259" r:id="rId5"/>
   </p:sldIdLst>
   <p:sldSz cx="12192000" cy="6858000"/>
   <p:notesSz cx="6858000" cy="9144000"/>
@@ -259,7 +262,7 @@
           <a:p>
             <a:fld id="{21EC0F65-C8A6-4531-AADA-AE6A3ED1014F}" type="datetimeFigureOut">
               <a:rPr lang="en-US" smtClean="0"/>
-              <a:t>8/17/2020</a:t>
+              <a:t>8/22/2020</a:t>
             </a:fld>
             <a:endParaRPr lang="en-US"/>
           </a:p>
@@ -457,7 +460,7 @@
           <a:p>
             <a:fld id="{21EC0F65-C8A6-4531-AADA-AE6A3ED1014F}" type="datetimeFigureOut">
               <a:rPr lang="en-US" smtClean="0"/>
-              <a:t>8/17/2020</a:t>
+              <a:t>8/22/2020</a:t>
             </a:fld>
             <a:endParaRPr lang="en-US"/>
           </a:p>
@@ -665,7 +668,7 @@
           <a:p>
             <a:fld id="{21EC0F65-C8A6-4531-AADA-AE6A3ED1014F}" type="datetimeFigureOut">
               <a:rPr lang="en-US" smtClean="0"/>
-              <a:t>8/17/2020</a:t>
+              <a:t>8/22/2020</a:t>
             </a:fld>
             <a:endParaRPr lang="en-US"/>
           </a:p>
@@ -863,7 +866,7 @@
           <a:p>
             <a:fld id="{21EC0F65-C8A6-4531-AADA-AE6A3ED1014F}" type="datetimeFigureOut">
               <a:rPr lang="en-US" smtClean="0"/>
-              <a:t>8/17/2020</a:t>
+              <a:t>8/22/2020</a:t>
             </a:fld>
             <a:endParaRPr lang="en-US"/>
           </a:p>
@@ -1138,7 +1141,7 @@
           <a:p>
             <a:fld id="{21EC0F65-C8A6-4531-AADA-AE6A3ED1014F}" type="datetimeFigureOut">
               <a:rPr lang="en-US" smtClean="0"/>
-              <a:t>8/17/2020</a:t>
+              <a:t>8/22/2020</a:t>
             </a:fld>
             <a:endParaRPr lang="en-US"/>
           </a:p>
@@ -1403,7 +1406,7 @@
           <a:p>
             <a:fld id="{21EC0F65-C8A6-4531-AADA-AE6A3ED1014F}" type="datetimeFigureOut">
               <a:rPr lang="en-US" smtClean="0"/>
-              <a:t>8/17/2020</a:t>
+              <a:t>8/22/2020</a:t>
             </a:fld>
             <a:endParaRPr lang="en-US"/>
           </a:p>
@@ -1815,7 +1818,7 @@
           <a:p>
             <a:fld id="{21EC0F65-C8A6-4531-AADA-AE6A3ED1014F}" type="datetimeFigureOut">
               <a:rPr lang="en-US" smtClean="0"/>
-              <a:t>8/17/2020</a:t>
+              <a:t>8/22/2020</a:t>
             </a:fld>
             <a:endParaRPr lang="en-US"/>
           </a:p>
@@ -1956,7 +1959,7 @@
           <a:p>
             <a:fld id="{21EC0F65-C8A6-4531-AADA-AE6A3ED1014F}" type="datetimeFigureOut">
               <a:rPr lang="en-US" smtClean="0"/>
-              <a:t>8/17/2020</a:t>
+              <a:t>8/22/2020</a:t>
             </a:fld>
             <a:endParaRPr lang="en-US"/>
           </a:p>
@@ -2069,7 +2072,7 @@
           <a:p>
             <a:fld id="{21EC0F65-C8A6-4531-AADA-AE6A3ED1014F}" type="datetimeFigureOut">
               <a:rPr lang="en-US" smtClean="0"/>
-              <a:t>8/17/2020</a:t>
+              <a:t>8/22/2020</a:t>
             </a:fld>
             <a:endParaRPr lang="en-US"/>
           </a:p>
@@ -2380,7 +2383,7 @@
           <a:p>
             <a:fld id="{21EC0F65-C8A6-4531-AADA-AE6A3ED1014F}" type="datetimeFigureOut">
               <a:rPr lang="en-US" smtClean="0"/>
-              <a:t>8/17/2020</a:t>
+              <a:t>8/22/2020</a:t>
             </a:fld>
             <a:endParaRPr lang="en-US"/>
           </a:p>
@@ -2668,7 +2671,7 @@
           <a:p>
             <a:fld id="{21EC0F65-C8A6-4531-AADA-AE6A3ED1014F}" type="datetimeFigureOut">
               <a:rPr lang="en-US" smtClean="0"/>
-              <a:t>8/17/2020</a:t>
+              <a:t>8/22/2020</a:t>
             </a:fld>
             <a:endParaRPr lang="en-US"/>
           </a:p>
@@ -2909,7 +2912,7 @@
           <a:p>
             <a:fld id="{21EC0F65-C8A6-4531-AADA-AE6A3ED1014F}" type="datetimeFigureOut">
               <a:rPr lang="en-US" smtClean="0"/>
-              <a:t>8/17/2020</a:t>
+              <a:t>8/22/2020</a:t>
             </a:fld>
             <a:endParaRPr lang="en-US"/>
           </a:p>
@@ -5324,6 +5327,635 @@
 </p:sld>
 </file>
 
+<file path=ppt/slides/slide2.xml><?xml version="1.0" encoding="utf-8"?>
+<p:sld xmlns:a="http://schemas.openxmlformats.org/drawingml/2006/main" xmlns:r="http://schemas.openxmlformats.org/officeDocument/2006/relationships" xmlns:p="http://schemas.openxmlformats.org/presentationml/2006/main">
+  <p:cSld>
+    <p:spTree>
+      <p:nvGrpSpPr>
+        <p:cNvPr id="1" name=""/>
+        <p:cNvGrpSpPr/>
+        <p:nvPr/>
+      </p:nvGrpSpPr>
+      <p:grpSpPr>
+        <a:xfrm>
+          <a:off x="0" y="0"/>
+          <a:ext cx="0" cy="0"/>
+          <a:chOff x="0" y="0"/>
+          <a:chExt cx="0" cy="0"/>
+        </a:xfrm>
+      </p:grpSpPr>
+      <p:grpSp>
+        <p:nvGrpSpPr>
+          <p:cNvPr id="16" name="Group 15">
+            <a:extLst>
+              <a:ext uri="{FF2B5EF4-FFF2-40B4-BE49-F238E27FC236}">
+                <a16:creationId xmlns:a16="http://schemas.microsoft.com/office/drawing/2014/main" id="{561D51D7-054D-4D7E-949D-B0B058C64370}"/>
+              </a:ext>
+            </a:extLst>
+          </p:cNvPr>
+          <p:cNvGrpSpPr/>
+          <p:nvPr/>
+        </p:nvGrpSpPr>
+        <p:grpSpPr>
+          <a:xfrm>
+            <a:off x="150721" y="0"/>
+            <a:ext cx="11890558" cy="6858000"/>
+            <a:chOff x="779305" y="709695"/>
+            <a:chExt cx="10400393" cy="5998532"/>
+          </a:xfrm>
+        </p:grpSpPr>
+        <p:pic>
+          <p:nvPicPr>
+            <p:cNvPr id="5" name="Picture 4" descr="A picture containing object, clock&#10;&#10;Description automatically generated">
+              <a:extLst>
+                <a:ext uri="{FF2B5EF4-FFF2-40B4-BE49-F238E27FC236}">
+                  <a16:creationId xmlns:a16="http://schemas.microsoft.com/office/drawing/2014/main" id="{9D6047CA-3317-4AE1-ADF8-F2D64E7FCCD6}"/>
+                </a:ext>
+              </a:extLst>
+            </p:cNvPr>
+            <p:cNvPicPr>
+              <a:picLocks noChangeAspect="1"/>
+            </p:cNvPicPr>
+            <p:nvPr/>
+          </p:nvPicPr>
+          <p:blipFill>
+            <a:blip r:embed="rId2">
+              <a:extLst>
+                <a:ext uri="{28A0092B-C50C-407E-A947-70E740481C1C}">
+                  <a14:useLocalDpi xmlns:a14="http://schemas.microsoft.com/office/drawing/2010/main" val="0"/>
+                </a:ext>
+              </a:extLst>
+            </a:blip>
+            <a:stretch>
+              <a:fillRect/>
+            </a:stretch>
+          </p:blipFill>
+          <p:spPr>
+            <a:xfrm>
+              <a:off x="779305" y="709695"/>
+              <a:ext cx="3362794" cy="3304744"/>
+            </a:xfrm>
+            <a:prstGeom prst="rect">
+              <a:avLst/>
+            </a:prstGeom>
+          </p:spPr>
+        </p:pic>
+        <p:pic>
+          <p:nvPicPr>
+            <p:cNvPr id="7" name="Picture 6" descr="A picture containing stool&#10;&#10;Description automatically generated">
+              <a:extLst>
+                <a:ext uri="{FF2B5EF4-FFF2-40B4-BE49-F238E27FC236}">
+                  <a16:creationId xmlns:a16="http://schemas.microsoft.com/office/drawing/2014/main" id="{31640975-DEFD-4624-B097-AABB8C31D0FE}"/>
+                </a:ext>
+              </a:extLst>
+            </p:cNvPr>
+            <p:cNvPicPr>
+              <a:picLocks noChangeAspect="1"/>
+            </p:cNvPicPr>
+            <p:nvPr/>
+          </p:nvPicPr>
+          <p:blipFill rotWithShape="1">
+            <a:blip r:embed="rId3">
+              <a:extLst>
+                <a:ext uri="{28A0092B-C50C-407E-A947-70E740481C1C}">
+                  <a14:useLocalDpi xmlns:a14="http://schemas.microsoft.com/office/drawing/2010/main" val="0"/>
+                </a:ext>
+              </a:extLst>
+            </a:blip>
+            <a:srcRect b="884"/>
+            <a:stretch/>
+          </p:blipFill>
+          <p:spPr>
+            <a:xfrm>
+              <a:off x="4250472" y="709696"/>
+              <a:ext cx="3334215" cy="3304744"/>
+            </a:xfrm>
+            <a:prstGeom prst="rect">
+              <a:avLst/>
+            </a:prstGeom>
+          </p:spPr>
+        </p:pic>
+        <p:pic>
+          <p:nvPicPr>
+            <p:cNvPr id="9" name="Picture 8">
+              <a:extLst>
+                <a:ext uri="{FF2B5EF4-FFF2-40B4-BE49-F238E27FC236}">
+                  <a16:creationId xmlns:a16="http://schemas.microsoft.com/office/drawing/2014/main" id="{ED6B8B8E-2C14-4391-AC30-D5A06D036929}"/>
+                </a:ext>
+              </a:extLst>
+            </p:cNvPr>
+            <p:cNvPicPr>
+              <a:picLocks noChangeAspect="1"/>
+            </p:cNvPicPr>
+            <p:nvPr/>
+          </p:nvPicPr>
+          <p:blipFill rotWithShape="1">
+            <a:blip r:embed="rId4">
+              <a:extLst>
+                <a:ext uri="{28A0092B-C50C-407E-A947-70E740481C1C}">
+                  <a14:useLocalDpi xmlns:a14="http://schemas.microsoft.com/office/drawing/2010/main" val="0"/>
+                </a:ext>
+              </a:extLst>
+            </a:blip>
+            <a:srcRect b="2555"/>
+            <a:stretch/>
+          </p:blipFill>
+          <p:spPr>
+            <a:xfrm>
+              <a:off x="7693060" y="709696"/>
+              <a:ext cx="3486637" cy="3304744"/>
+            </a:xfrm>
+            <a:prstGeom prst="rect">
+              <a:avLst/>
+            </a:prstGeom>
+          </p:spPr>
+        </p:pic>
+        <p:pic>
+          <p:nvPicPr>
+            <p:cNvPr id="11" name="Picture 10" descr="A picture containing air, plane, game, flying&#10;&#10;Description automatically generated">
+              <a:extLst>
+                <a:ext uri="{FF2B5EF4-FFF2-40B4-BE49-F238E27FC236}">
+                  <a16:creationId xmlns:a16="http://schemas.microsoft.com/office/drawing/2014/main" id="{BD5860A2-3F29-4D1E-ABF8-7B0CD8643A05}"/>
+                </a:ext>
+              </a:extLst>
+            </p:cNvPr>
+            <p:cNvPicPr>
+              <a:picLocks noChangeAspect="1"/>
+            </p:cNvPicPr>
+            <p:nvPr/>
+          </p:nvPicPr>
+          <p:blipFill>
+            <a:blip r:embed="rId5">
+              <a:extLst>
+                <a:ext uri="{28A0092B-C50C-407E-A947-70E740481C1C}">
+                  <a14:useLocalDpi xmlns:a14="http://schemas.microsoft.com/office/drawing/2010/main" val="0"/>
+                </a:ext>
+              </a:extLst>
+            </a:blip>
+            <a:stretch>
+              <a:fillRect/>
+            </a:stretch>
+          </p:blipFill>
+          <p:spPr>
+            <a:xfrm>
+              <a:off x="779305" y="4101068"/>
+              <a:ext cx="3362794" cy="2607159"/>
+            </a:xfrm>
+            <a:prstGeom prst="rect">
+              <a:avLst/>
+            </a:prstGeom>
+          </p:spPr>
+        </p:pic>
+        <p:pic>
+          <p:nvPicPr>
+            <p:cNvPr id="13" name="Picture 12" descr="A picture containing sitting, cat, bird, bear&#10;&#10;Description automatically generated">
+              <a:extLst>
+                <a:ext uri="{FF2B5EF4-FFF2-40B4-BE49-F238E27FC236}">
+                  <a16:creationId xmlns:a16="http://schemas.microsoft.com/office/drawing/2014/main" id="{31296782-8F7A-4CC4-917A-86A013BB1CB3}"/>
+                </a:ext>
+              </a:extLst>
+            </p:cNvPr>
+            <p:cNvPicPr>
+              <a:picLocks noChangeAspect="1"/>
+            </p:cNvPicPr>
+            <p:nvPr/>
+          </p:nvPicPr>
+          <p:blipFill>
+            <a:blip r:embed="rId6">
+              <a:extLst>
+                <a:ext uri="{28A0092B-C50C-407E-A947-70E740481C1C}">
+                  <a14:useLocalDpi xmlns:a14="http://schemas.microsoft.com/office/drawing/2010/main" val="0"/>
+                </a:ext>
+              </a:extLst>
+            </a:blip>
+            <a:stretch>
+              <a:fillRect/>
+            </a:stretch>
+          </p:blipFill>
+          <p:spPr>
+            <a:xfrm>
+              <a:off x="4250472" y="4527418"/>
+              <a:ext cx="3334215" cy="1754458"/>
+            </a:xfrm>
+            <a:prstGeom prst="rect">
+              <a:avLst/>
+            </a:prstGeom>
+          </p:spPr>
+        </p:pic>
+        <p:pic>
+          <p:nvPicPr>
+            <p:cNvPr id="15" name="Picture 14" descr="A picture containing umbrella&#10;&#10;Description automatically generated">
+              <a:extLst>
+                <a:ext uri="{FF2B5EF4-FFF2-40B4-BE49-F238E27FC236}">
+                  <a16:creationId xmlns:a16="http://schemas.microsoft.com/office/drawing/2014/main" id="{D367E3D8-E54A-4E00-8722-8A2C2AFA002B}"/>
+                </a:ext>
+              </a:extLst>
+            </p:cNvPr>
+            <p:cNvPicPr>
+              <a:picLocks noChangeAspect="1"/>
+            </p:cNvPicPr>
+            <p:nvPr/>
+          </p:nvPicPr>
+          <p:blipFill rotWithShape="1">
+            <a:blip r:embed="rId7">
+              <a:extLst>
+                <a:ext uri="{28A0092B-C50C-407E-A947-70E740481C1C}">
+                  <a14:useLocalDpi xmlns:a14="http://schemas.microsoft.com/office/drawing/2010/main" val="0"/>
+                </a:ext>
+              </a:extLst>
+            </a:blip>
+            <a:srcRect l="2654" r="3131"/>
+            <a:stretch/>
+          </p:blipFill>
+          <p:spPr>
+            <a:xfrm rot="16200000">
+              <a:off x="8132801" y="3661330"/>
+              <a:ext cx="2607158" cy="3486636"/>
+            </a:xfrm>
+            <a:prstGeom prst="rect">
+              <a:avLst/>
+            </a:prstGeom>
+          </p:spPr>
+        </p:pic>
+      </p:grpSp>
+    </p:spTree>
+    <p:extLst>
+      <p:ext uri="{BB962C8B-B14F-4D97-AF65-F5344CB8AC3E}">
+        <p14:creationId xmlns:p14="http://schemas.microsoft.com/office/powerpoint/2010/main" val="153188837"/>
+      </p:ext>
+    </p:extLst>
+  </p:cSld>
+  <p:clrMapOvr>
+    <a:masterClrMapping/>
+  </p:clrMapOvr>
+</p:sld>
+</file>
+
+<file path=ppt/slides/slide3.xml><?xml version="1.0" encoding="utf-8"?>
+<p:sld xmlns:a="http://schemas.openxmlformats.org/drawingml/2006/main" xmlns:r="http://schemas.openxmlformats.org/officeDocument/2006/relationships" xmlns:p="http://schemas.openxmlformats.org/presentationml/2006/main">
+  <p:cSld>
+    <p:bg>
+      <p:bgPr>
+        <a:solidFill>
+          <a:schemeClr val="bg1"/>
+        </a:solidFill>
+        <a:effectLst/>
+      </p:bgPr>
+    </p:bg>
+    <p:spTree>
+      <p:nvGrpSpPr>
+        <p:cNvPr id="1" name=""/>
+        <p:cNvGrpSpPr/>
+        <p:nvPr/>
+      </p:nvGrpSpPr>
+      <p:grpSpPr>
+        <a:xfrm>
+          <a:off x="0" y="0"/>
+          <a:ext cx="0" cy="0"/>
+          <a:chOff x="0" y="0"/>
+          <a:chExt cx="0" cy="0"/>
+        </a:xfrm>
+      </p:grpSpPr>
+      <p:pic>
+        <p:nvPicPr>
+          <p:cNvPr id="11" name="Picture 10">
+            <a:extLst>
+              <a:ext uri="{FF2B5EF4-FFF2-40B4-BE49-F238E27FC236}">
+                <a16:creationId xmlns:a16="http://schemas.microsoft.com/office/drawing/2014/main" id="{A4315981-8DD0-4127-952A-ED9A65FCABD0}"/>
+              </a:ext>
+            </a:extLst>
+          </p:cNvPr>
+          <p:cNvPicPr>
+            <a:picLocks noChangeAspect="1"/>
+          </p:cNvPicPr>
+          <p:nvPr/>
+        </p:nvPicPr>
+        <p:blipFill>
+          <a:blip r:embed="rId2"/>
+          <a:stretch>
+            <a:fillRect/>
+          </a:stretch>
+        </p:blipFill>
+        <p:spPr>
+          <a:xfrm>
+            <a:off x="952500" y="0"/>
+            <a:ext cx="10286999" cy="6858000"/>
+          </a:xfrm>
+          <a:prstGeom prst="rect">
+            <a:avLst/>
+          </a:prstGeom>
+        </p:spPr>
+      </p:pic>
+    </p:spTree>
+    <p:extLst>
+      <p:ext uri="{BB962C8B-B14F-4D97-AF65-F5344CB8AC3E}">
+        <p14:creationId xmlns:p14="http://schemas.microsoft.com/office/powerpoint/2010/main" val="209926842"/>
+      </p:ext>
+    </p:extLst>
+  </p:cSld>
+  <p:clrMapOvr>
+    <a:masterClrMapping/>
+  </p:clrMapOvr>
+</p:sld>
+</file>
+
+<file path=ppt/slides/slide4.xml><?xml version="1.0" encoding="utf-8"?>
+<p:sld xmlns:a="http://schemas.openxmlformats.org/drawingml/2006/main" xmlns:r="http://schemas.openxmlformats.org/officeDocument/2006/relationships" xmlns:p="http://schemas.openxmlformats.org/presentationml/2006/main">
+  <p:cSld>
+    <p:bg>
+      <p:bgPr>
+        <a:solidFill>
+          <a:schemeClr val="bg1"/>
+        </a:solidFill>
+        <a:effectLst/>
+      </p:bgPr>
+    </p:bg>
+    <p:spTree>
+      <p:nvGrpSpPr>
+        <p:cNvPr id="1" name=""/>
+        <p:cNvGrpSpPr/>
+        <p:nvPr/>
+      </p:nvGrpSpPr>
+      <p:grpSpPr>
+        <a:xfrm>
+          <a:off x="0" y="0"/>
+          <a:ext cx="0" cy="0"/>
+          <a:chOff x="0" y="0"/>
+          <a:chExt cx="0" cy="0"/>
+        </a:xfrm>
+      </p:grpSpPr>
+      <p:sp useBgFill="1">
+        <p:nvSpPr>
+          <p:cNvPr id="21" name="Rectangle 16">
+            <a:extLst>
+              <a:ext uri="{FF2B5EF4-FFF2-40B4-BE49-F238E27FC236}">
+                <a16:creationId xmlns:a16="http://schemas.microsoft.com/office/drawing/2014/main" id="{FABB624F-BF77-4AE1-B71D-2D681D4731B8}"/>
+              </a:ext>
+              <a:ext uri="{C183D7F6-B498-43B3-948B-1728B52AA6E4}">
+                <adec:decorative xmlns:adec="http://schemas.microsoft.com/office/drawing/2017/decorative" val="1"/>
+              </a:ext>
+            </a:extLst>
+          </p:cNvPr>
+          <p:cNvSpPr>
+            <a:spLocks noGrp="1" noRot="1" noChangeAspect="1" noMove="1" noResize="1" noEditPoints="1" noAdjustHandles="1" noChangeArrowheads="1" noChangeShapeType="1" noTextEdit="1"/>
+          </p:cNvSpPr>
+          <p:nvPr>
+            <p:extLst>
+              <p:ext uri="{386F3935-93C4-4BCD-93E2-E3B085C9AB24}">
+                <p16:designElem xmlns:p16="http://schemas.microsoft.com/office/powerpoint/2015/main" val="1"/>
+              </p:ext>
+            </p:extLst>
+          </p:nvPr>
+        </p:nvSpPr>
+        <p:spPr bwMode="white">
+          <a:xfrm>
+            <a:off x="1524" y="0"/>
+            <a:ext cx="12188952" cy="6858000"/>
+          </a:xfrm>
+          <a:prstGeom prst="rect">
+            <a:avLst/>
+          </a:prstGeom>
+          <a:ln>
+            <a:noFill/>
+          </a:ln>
+        </p:spPr>
+        <p:style>
+          <a:lnRef idx="2">
+            <a:schemeClr val="accent1">
+              <a:shade val="50000"/>
+            </a:schemeClr>
+          </a:lnRef>
+          <a:fillRef idx="1">
+            <a:schemeClr val="accent1"/>
+          </a:fillRef>
+          <a:effectRef idx="0">
+            <a:schemeClr val="accent1"/>
+          </a:effectRef>
+          <a:fontRef idx="minor">
+            <a:schemeClr val="lt1"/>
+          </a:fontRef>
+        </p:style>
+        <p:txBody>
+          <a:bodyPr rtlCol="0" anchor="ctr"/>
+          <a:lstStyle>
+            <a:defPPr>
+              <a:defRPr lang="en-US"/>
+            </a:defPPr>
+            <a:lvl1pPr marL="0" algn="l" defTabSz="914400" rtl="0" eaLnBrk="1" latinLnBrk="0" hangingPunct="1">
+              <a:defRPr sz="1800" kern="1200">
+                <a:solidFill>
+                  <a:schemeClr val="lt1"/>
+                </a:solidFill>
+                <a:latin typeface="+mn-lt"/>
+                <a:ea typeface="+mn-ea"/>
+                <a:cs typeface="+mn-cs"/>
+              </a:defRPr>
+            </a:lvl1pPr>
+            <a:lvl2pPr marL="457200" algn="l" defTabSz="914400" rtl="0" eaLnBrk="1" latinLnBrk="0" hangingPunct="1">
+              <a:defRPr sz="1800" kern="1200">
+                <a:solidFill>
+                  <a:schemeClr val="lt1"/>
+                </a:solidFill>
+                <a:latin typeface="+mn-lt"/>
+                <a:ea typeface="+mn-ea"/>
+                <a:cs typeface="+mn-cs"/>
+              </a:defRPr>
+            </a:lvl2pPr>
+            <a:lvl3pPr marL="914400" algn="l" defTabSz="914400" rtl="0" eaLnBrk="1" latinLnBrk="0" hangingPunct="1">
+              <a:defRPr sz="1800" kern="1200">
+                <a:solidFill>
+                  <a:schemeClr val="lt1"/>
+                </a:solidFill>
+                <a:latin typeface="+mn-lt"/>
+                <a:ea typeface="+mn-ea"/>
+                <a:cs typeface="+mn-cs"/>
+              </a:defRPr>
+            </a:lvl3pPr>
+            <a:lvl4pPr marL="1371600" algn="l" defTabSz="914400" rtl="0" eaLnBrk="1" latinLnBrk="0" hangingPunct="1">
+              <a:defRPr sz="1800" kern="1200">
+                <a:solidFill>
+                  <a:schemeClr val="lt1"/>
+                </a:solidFill>
+                <a:latin typeface="+mn-lt"/>
+                <a:ea typeface="+mn-ea"/>
+                <a:cs typeface="+mn-cs"/>
+              </a:defRPr>
+            </a:lvl4pPr>
+            <a:lvl5pPr marL="1828800" algn="l" defTabSz="914400" rtl="0" eaLnBrk="1" latinLnBrk="0" hangingPunct="1">
+              <a:defRPr sz="1800" kern="1200">
+                <a:solidFill>
+                  <a:schemeClr val="lt1"/>
+                </a:solidFill>
+                <a:latin typeface="+mn-lt"/>
+                <a:ea typeface="+mn-ea"/>
+                <a:cs typeface="+mn-cs"/>
+              </a:defRPr>
+            </a:lvl5pPr>
+            <a:lvl6pPr marL="2286000" algn="l" defTabSz="914400" rtl="0" eaLnBrk="1" latinLnBrk="0" hangingPunct="1">
+              <a:defRPr sz="1800" kern="1200">
+                <a:solidFill>
+                  <a:schemeClr val="lt1"/>
+                </a:solidFill>
+                <a:latin typeface="+mn-lt"/>
+                <a:ea typeface="+mn-ea"/>
+                <a:cs typeface="+mn-cs"/>
+              </a:defRPr>
+            </a:lvl6pPr>
+            <a:lvl7pPr marL="2743200" algn="l" defTabSz="914400" rtl="0" eaLnBrk="1" latinLnBrk="0" hangingPunct="1">
+              <a:defRPr sz="1800" kern="1200">
+                <a:solidFill>
+                  <a:schemeClr val="lt1"/>
+                </a:solidFill>
+                <a:latin typeface="+mn-lt"/>
+                <a:ea typeface="+mn-ea"/>
+                <a:cs typeface="+mn-cs"/>
+              </a:defRPr>
+            </a:lvl7pPr>
+            <a:lvl8pPr marL="3200400" algn="l" defTabSz="914400" rtl="0" eaLnBrk="1" latinLnBrk="0" hangingPunct="1">
+              <a:defRPr sz="1800" kern="1200">
+                <a:solidFill>
+                  <a:schemeClr val="lt1"/>
+                </a:solidFill>
+                <a:latin typeface="+mn-lt"/>
+                <a:ea typeface="+mn-ea"/>
+                <a:cs typeface="+mn-cs"/>
+              </a:defRPr>
+            </a:lvl8pPr>
+            <a:lvl9pPr marL="3657600" algn="l" defTabSz="914400" rtl="0" eaLnBrk="1" latinLnBrk="0" hangingPunct="1">
+              <a:defRPr sz="1800" kern="1200">
+                <a:solidFill>
+                  <a:schemeClr val="lt1"/>
+                </a:solidFill>
+                <a:latin typeface="+mn-lt"/>
+                <a:ea typeface="+mn-ea"/>
+                <a:cs typeface="+mn-cs"/>
+              </a:defRPr>
+            </a:lvl9pPr>
+          </a:lstStyle>
+          <a:p>
+            <a:pPr algn="ctr"/>
+            <a:endParaRPr lang="en-US"/>
+          </a:p>
+        </p:txBody>
+      </p:sp>
+      <p:pic>
+        <p:nvPicPr>
+          <p:cNvPr id="12" name="Picture 11" descr="A picture containing person, room, ottoman, refrigerator&#10;&#10;Description automatically generated">
+            <a:extLst>
+              <a:ext uri="{FF2B5EF4-FFF2-40B4-BE49-F238E27FC236}">
+                <a16:creationId xmlns:a16="http://schemas.microsoft.com/office/drawing/2014/main" id="{9FD36C92-872C-4CF6-8BE6-D1B34D6D83F1}"/>
+              </a:ext>
+            </a:extLst>
+          </p:cNvPr>
+          <p:cNvPicPr>
+            <a:picLocks noChangeAspect="1"/>
+          </p:cNvPicPr>
+          <p:nvPr/>
+        </p:nvPicPr>
+        <p:blipFill rotWithShape="1">
+          <a:blip r:embed="rId2">
+            <a:extLst>
+              <a:ext uri="{28A0092B-C50C-407E-A947-70E740481C1C}">
+                <a14:useLocalDpi xmlns:a14="http://schemas.microsoft.com/office/drawing/2010/main" val="0"/>
+              </a:ext>
+            </a:extLst>
+          </a:blip>
+          <a:srcRect l="19111" r="-1"/>
+          <a:stretch/>
+        </p:blipFill>
+        <p:spPr>
+          <a:xfrm>
+            <a:off x="671756" y="3602427"/>
+            <a:ext cx="3685034" cy="2642256"/>
+          </a:xfrm>
+          <a:prstGeom prst="rect">
+            <a:avLst/>
+          </a:prstGeom>
+        </p:spPr>
+      </p:pic>
+      <p:pic>
+        <p:nvPicPr>
+          <p:cNvPr id="8" name="Picture 7" descr="A picture containing water, person&#10;&#10;Description automatically generated">
+            <a:extLst>
+              <a:ext uri="{FF2B5EF4-FFF2-40B4-BE49-F238E27FC236}">
+                <a16:creationId xmlns:a16="http://schemas.microsoft.com/office/drawing/2014/main" id="{788AAFEB-A461-414A-A33E-87E0D8DE3680}"/>
+              </a:ext>
+            </a:extLst>
+          </p:cNvPr>
+          <p:cNvPicPr>
+            <a:picLocks noChangeAspect="1"/>
+          </p:cNvPicPr>
+          <p:nvPr/>
+        </p:nvPicPr>
+        <p:blipFill rotWithShape="1">
+          <a:blip r:embed="rId3">
+            <a:extLst>
+              <a:ext uri="{28A0092B-C50C-407E-A947-70E740481C1C}">
+                <a14:useLocalDpi xmlns:a14="http://schemas.microsoft.com/office/drawing/2010/main" val="0"/>
+              </a:ext>
+            </a:extLst>
+          </a:blip>
+          <a:srcRect l="36894" t="-7187" r="12335" b="13639"/>
+          <a:stretch/>
+        </p:blipFill>
+        <p:spPr>
+          <a:xfrm>
+            <a:off x="4521376" y="3514371"/>
+            <a:ext cx="3685034" cy="2648015"/>
+          </a:xfrm>
+          <a:prstGeom prst="rect">
+            <a:avLst/>
+          </a:prstGeom>
+        </p:spPr>
+      </p:pic>
+      <p:pic>
+        <p:nvPicPr>
+          <p:cNvPr id="10" name="Picture 9" descr="A picture containing table, cake&#10;&#10;Description automatically generated">
+            <a:extLst>
+              <a:ext uri="{FF2B5EF4-FFF2-40B4-BE49-F238E27FC236}">
+                <a16:creationId xmlns:a16="http://schemas.microsoft.com/office/drawing/2014/main" id="{C47899FA-DE03-43E2-9C82-9E16181A59B5}"/>
+              </a:ext>
+            </a:extLst>
+          </p:cNvPr>
+          <p:cNvPicPr>
+            <a:picLocks noChangeAspect="1"/>
+          </p:cNvPicPr>
+          <p:nvPr/>
+        </p:nvPicPr>
+        <p:blipFill rotWithShape="1">
+          <a:blip r:embed="rId4">
+            <a:extLst>
+              <a:ext uri="{28A0092B-C50C-407E-A947-70E740481C1C}">
+                <a14:useLocalDpi xmlns:a14="http://schemas.microsoft.com/office/drawing/2010/main" val="0"/>
+              </a:ext>
+            </a:extLst>
+          </a:blip>
+          <a:srcRect l="43311" r="-19"/>
+          <a:stretch/>
+        </p:blipFill>
+        <p:spPr>
+          <a:xfrm>
+            <a:off x="8355926" y="3602427"/>
+            <a:ext cx="3685034" cy="2648014"/>
+          </a:xfrm>
+          <a:prstGeom prst="rect">
+            <a:avLst/>
+          </a:prstGeom>
+        </p:spPr>
+      </p:pic>
+    </p:spTree>
+    <p:extLst>
+      <p:ext uri="{BB962C8B-B14F-4D97-AF65-F5344CB8AC3E}">
+        <p14:creationId xmlns:p14="http://schemas.microsoft.com/office/powerpoint/2010/main" val="830457584"/>
+      </p:ext>
+    </p:extLst>
+  </p:cSld>
+  <p:clrMapOvr>
+    <a:masterClrMapping/>
+  </p:clrMapOvr>
+</p:sld>
+</file>
+
 <file path=ppt/theme/theme1.xml><?xml version="1.0" encoding="utf-8"?>
 <a:theme xmlns:a="http://schemas.openxmlformats.org/drawingml/2006/main" name="Office Theme">
   <a:themeElements>

</xml_diff>